<commit_message>
changed screenshot objet view
</commit_message>
<xml_diff>
--- a/slides.pptx
+++ b/slides.pptx
@@ -245,7 +245,7 @@
           <a:p>
             <a:fld id="{663C36E9-1212-43A6-83EE-08F3EB575BE2}" type="datetimeFigureOut">
               <a:rPr lang="de-DE" smtClean="0"/>
-              <a:t>12.11.2020</a:t>
+              <a:t>17.11.2020</a:t>
             </a:fld>
             <a:endParaRPr lang="de-DE"/>
           </a:p>
@@ -415,7 +415,7 @@
           <a:p>
             <a:fld id="{663C36E9-1212-43A6-83EE-08F3EB575BE2}" type="datetimeFigureOut">
               <a:rPr lang="de-DE" smtClean="0"/>
-              <a:t>12.11.2020</a:t>
+              <a:t>17.11.2020</a:t>
             </a:fld>
             <a:endParaRPr lang="de-DE"/>
           </a:p>
@@ -595,7 +595,7 @@
           <a:p>
             <a:fld id="{663C36E9-1212-43A6-83EE-08F3EB575BE2}" type="datetimeFigureOut">
               <a:rPr lang="de-DE" smtClean="0"/>
-              <a:t>12.11.2020</a:t>
+              <a:t>17.11.2020</a:t>
             </a:fld>
             <a:endParaRPr lang="de-DE"/>
           </a:p>
@@ -765,7 +765,7 @@
           <a:p>
             <a:fld id="{663C36E9-1212-43A6-83EE-08F3EB575BE2}" type="datetimeFigureOut">
               <a:rPr lang="de-DE" smtClean="0"/>
-              <a:t>12.11.2020</a:t>
+              <a:t>17.11.2020</a:t>
             </a:fld>
             <a:endParaRPr lang="de-DE"/>
           </a:p>
@@ -1009,7 +1009,7 @@
           <a:p>
             <a:fld id="{663C36E9-1212-43A6-83EE-08F3EB575BE2}" type="datetimeFigureOut">
               <a:rPr lang="de-DE" smtClean="0"/>
-              <a:t>12.11.2020</a:t>
+              <a:t>17.11.2020</a:t>
             </a:fld>
             <a:endParaRPr lang="de-DE"/>
           </a:p>
@@ -1241,7 +1241,7 @@
           <a:p>
             <a:fld id="{663C36E9-1212-43A6-83EE-08F3EB575BE2}" type="datetimeFigureOut">
               <a:rPr lang="de-DE" smtClean="0"/>
-              <a:t>12.11.2020</a:t>
+              <a:t>17.11.2020</a:t>
             </a:fld>
             <a:endParaRPr lang="de-DE"/>
           </a:p>
@@ -1608,7 +1608,7 @@
           <a:p>
             <a:fld id="{663C36E9-1212-43A6-83EE-08F3EB575BE2}" type="datetimeFigureOut">
               <a:rPr lang="de-DE" smtClean="0"/>
-              <a:t>12.11.2020</a:t>
+              <a:t>17.11.2020</a:t>
             </a:fld>
             <a:endParaRPr lang="de-DE"/>
           </a:p>
@@ -1726,7 +1726,7 @@
           <a:p>
             <a:fld id="{663C36E9-1212-43A6-83EE-08F3EB575BE2}" type="datetimeFigureOut">
               <a:rPr lang="de-DE" smtClean="0"/>
-              <a:t>12.11.2020</a:t>
+              <a:t>17.11.2020</a:t>
             </a:fld>
             <a:endParaRPr lang="de-DE"/>
           </a:p>
@@ -1821,7 +1821,7 @@
           <a:p>
             <a:fld id="{663C36E9-1212-43A6-83EE-08F3EB575BE2}" type="datetimeFigureOut">
               <a:rPr lang="de-DE" smtClean="0"/>
-              <a:t>12.11.2020</a:t>
+              <a:t>17.11.2020</a:t>
             </a:fld>
             <a:endParaRPr lang="de-DE"/>
           </a:p>
@@ -2098,7 +2098,7 @@
           <a:p>
             <a:fld id="{663C36E9-1212-43A6-83EE-08F3EB575BE2}" type="datetimeFigureOut">
               <a:rPr lang="de-DE" smtClean="0"/>
-              <a:t>12.11.2020</a:t>
+              <a:t>17.11.2020</a:t>
             </a:fld>
             <a:endParaRPr lang="de-DE"/>
           </a:p>
@@ -2355,7 +2355,7 @@
           <a:p>
             <a:fld id="{663C36E9-1212-43A6-83EE-08F3EB575BE2}" type="datetimeFigureOut">
               <a:rPr lang="de-DE" smtClean="0"/>
-              <a:t>12.11.2020</a:t>
+              <a:t>17.11.2020</a:t>
             </a:fld>
             <a:endParaRPr lang="de-DE"/>
           </a:p>
@@ -2568,7 +2568,7 @@
           <a:p>
             <a:fld id="{663C36E9-1212-43A6-83EE-08F3EB575BE2}" type="datetimeFigureOut">
               <a:rPr lang="de-DE" smtClean="0"/>
-              <a:t>12.11.2020</a:t>
+              <a:t>17.11.2020</a:t>
             </a:fld>
             <a:endParaRPr lang="de-DE"/>
           </a:p>
@@ -3783,11 +3783,7 @@
             <a:pPr algn="ctr"/>
             <a:r>
               <a:rPr lang="de-DE" sz="1594" dirty="0" smtClean="0"/>
-              <a:t>right </a:t>
-            </a:r>
-            <a:r>
-              <a:rPr lang="de-DE" sz="1594" dirty="0" smtClean="0"/>
-              <a:t>click to show the object view</a:t>
+              <a:t>right click to show the object view</a:t>
             </a:r>
             <a:endParaRPr lang="de-DE" sz="1594" dirty="0"/>
           </a:p>
@@ -4481,15 +4477,7 @@
             <a:pPr algn="ctr"/>
             <a:r>
               <a:rPr lang="de-DE" sz="1594" dirty="0" smtClean="0"/>
-              <a:t>hold </a:t>
-            </a:r>
-            <a:r>
-              <a:rPr lang="de-DE" sz="1594" dirty="0" smtClean="0"/>
-              <a:t>right mouse button and </a:t>
-            </a:r>
-            <a:r>
-              <a:rPr lang="de-DE" sz="1594" dirty="0" smtClean="0"/>
-              <a:t>move the mouse to move the map</a:t>
+              <a:t>hold right mouse button and move the mouse to move the map</a:t>
             </a:r>
             <a:endParaRPr lang="de-DE" sz="1594" dirty="0"/>
           </a:p>
@@ -5426,21 +5414,22 @@
       </p:grpSpPr>
       <p:pic>
         <p:nvPicPr>
-          <p:cNvPr id="4" name="Picture 3"/>
+          <p:cNvPr id="2" name="Picture 1"/>
           <p:cNvPicPr>
             <a:picLocks noChangeAspect="1"/>
           </p:cNvPicPr>
           <p:nvPr/>
         </p:nvPicPr>
-        <p:blipFill rotWithShape="1">
+        <p:blipFill>
           <a:blip r:embed="rId2"/>
-          <a:srcRect r="41985"/>
-          <a:stretch/>
+          <a:stretch>
+            <a:fillRect/>
+          </a:stretch>
         </p:blipFill>
         <p:spPr>
           <a:xfrm>
-            <a:off x="2824253" y="2590800"/>
-            <a:ext cx="4414747" cy="3733006"/>
+            <a:off x="2781405" y="2539360"/>
+            <a:ext cx="5722210" cy="4041454"/>
           </a:xfrm>
           <a:prstGeom prst="rect">
             <a:avLst/>
@@ -5792,11 +5781,7 @@
             <a:pPr algn="ctr"/>
             <a:r>
               <a:rPr lang="de-DE" sz="1594" dirty="0" smtClean="0"/>
-              <a:t>creates a new object with the same attributes as </a:t>
-            </a:r>
-            <a:r>
-              <a:rPr lang="de-DE" sz="1594" dirty="0" smtClean="0"/>
-              <a:t>this,</a:t>
+              <a:t>creates a new object with the same attributes as this,</a:t>
             </a:r>
           </a:p>
           <a:p>
@@ -5805,7 +5790,6 @@
               <a:rPr lang="de-DE" sz="1594" dirty="0" smtClean="0"/>
               <a:t>and goes back to the map view</a:t>
             </a:r>
-            <a:endParaRPr lang="de-DE" sz="1594" dirty="0" smtClean="0"/>
           </a:p>
           <a:p>
             <a:pPr algn="ctr"/>
@@ -5825,7 +5809,7 @@
         </p:nvSpPr>
         <p:spPr>
           <a:xfrm>
-            <a:off x="5181600" y="6911714"/>
+            <a:off x="6337300" y="5441306"/>
             <a:ext cx="2867025" cy="955936"/>
           </a:xfrm>
           <a:prstGeom prst="rect">
@@ -5930,7 +5914,7 @@
         </p:nvSpPr>
         <p:spPr>
           <a:xfrm>
-            <a:off x="6686550" y="1227402"/>
+            <a:off x="7562850" y="2264276"/>
             <a:ext cx="2724150" cy="859629"/>
           </a:xfrm>
           <a:prstGeom prst="rect">
@@ -6079,8 +6063,8 @@
         </p:nvCxnSpPr>
         <p:spPr>
           <a:xfrm flipH="1">
-            <a:off x="3286125" y="1695450"/>
-            <a:ext cx="162856" cy="895350"/>
+            <a:off x="3314700" y="1695450"/>
+            <a:ext cx="134281" cy="843910"/>
           </a:xfrm>
           <a:prstGeom prst="straightConnector1">
             <a:avLst/>
@@ -6114,8 +6098,8 @@
         </p:nvCxnSpPr>
         <p:spPr>
           <a:xfrm flipH="1">
-            <a:off x="4181475" y="2095500"/>
-            <a:ext cx="1338263" cy="762000"/>
+            <a:off x="4448175" y="2095500"/>
+            <a:ext cx="1071563" cy="776956"/>
           </a:xfrm>
           <a:prstGeom prst="straightConnector1">
             <a:avLst/>
@@ -6143,14 +6127,14 @@
         <p:nvCxnSpPr>
           <p:cNvPr id="25" name="Straight Arrow Connector 24"/>
           <p:cNvCxnSpPr>
-            <a:stCxn id="14" idx="2"/>
+            <a:stCxn id="14" idx="1"/>
           </p:cNvCxnSpPr>
           <p:nvPr/>
         </p:nvCxnSpPr>
         <p:spPr>
           <a:xfrm flipH="1">
-            <a:off x="5981700" y="2087031"/>
-            <a:ext cx="2066925" cy="875244"/>
+            <a:off x="6337300" y="2694091"/>
+            <a:ext cx="1225550" cy="268184"/>
           </a:xfrm>
           <a:prstGeom prst="straightConnector1">
             <a:avLst/>
@@ -6185,7 +6169,7 @@
         <p:spPr>
           <a:xfrm>
             <a:off x="2293416" y="3134383"/>
-            <a:ext cx="687909" cy="381661"/>
+            <a:ext cx="706959" cy="376527"/>
           </a:xfrm>
           <a:prstGeom prst="straightConnector1">
             <a:avLst/>
@@ -6219,8 +6203,8 @@
         </p:nvCxnSpPr>
         <p:spPr>
           <a:xfrm flipV="1">
-            <a:off x="2293417" y="3781426"/>
-            <a:ext cx="687908" cy="238778"/>
+            <a:off x="2293417" y="3895725"/>
+            <a:ext cx="726008" cy="124479"/>
           </a:xfrm>
           <a:prstGeom prst="straightConnector1">
             <a:avLst/>
@@ -6254,8 +6238,8 @@
         </p:nvCxnSpPr>
         <p:spPr>
           <a:xfrm flipV="1">
-            <a:off x="2293416" y="4020204"/>
-            <a:ext cx="602184" cy="1143004"/>
+            <a:off x="2293416" y="4228431"/>
+            <a:ext cx="640284" cy="934777"/>
           </a:xfrm>
           <a:prstGeom prst="straightConnector1">
             <a:avLst/>
@@ -6289,8 +6273,8 @@
         </p:nvCxnSpPr>
         <p:spPr>
           <a:xfrm flipV="1">
-            <a:off x="2360090" y="4333876"/>
-            <a:ext cx="535510" cy="1800882"/>
+            <a:off x="2360090" y="4472533"/>
+            <a:ext cx="610886" cy="1662225"/>
           </a:xfrm>
           <a:prstGeom prst="straightConnector1">
             <a:avLst/>
@@ -6324,8 +6308,8 @@
         </p:nvCxnSpPr>
         <p:spPr>
           <a:xfrm flipV="1">
-            <a:off x="3224213" y="4981576"/>
-            <a:ext cx="309562" cy="1930138"/>
+            <a:off x="3224213" y="5163208"/>
+            <a:ext cx="355078" cy="1748506"/>
           </a:xfrm>
           <a:prstGeom prst="straightConnector1">
             <a:avLst/>
@@ -6353,14 +6337,14 @@
         <p:nvCxnSpPr>
           <p:cNvPr id="46" name="Straight Arrow Connector 45"/>
           <p:cNvCxnSpPr>
-            <a:stCxn id="12" idx="0"/>
+            <a:stCxn id="12" idx="1"/>
           </p:cNvCxnSpPr>
           <p:nvPr/>
         </p:nvCxnSpPr>
         <p:spPr>
           <a:xfrm flipH="1" flipV="1">
-            <a:off x="4181475" y="5343525"/>
-            <a:ext cx="2433638" cy="1568189"/>
+            <a:off x="4318000" y="5600700"/>
+            <a:ext cx="2019300" cy="318574"/>
           </a:xfrm>
           <a:prstGeom prst="straightConnector1">
             <a:avLst/>
@@ -6396,6 +6380,189 @@
           <a:xfrm flipH="1">
             <a:off x="5724525" y="4020203"/>
             <a:ext cx="1695450" cy="1"/>
+          </a:xfrm>
+          <a:prstGeom prst="straightConnector1">
+            <a:avLst/>
+          </a:prstGeom>
+          <a:ln>
+            <a:tailEnd type="triangle"/>
+          </a:ln>
+        </p:spPr>
+        <p:style>
+          <a:lnRef idx="3">
+            <a:schemeClr val="accent2"/>
+          </a:lnRef>
+          <a:fillRef idx="0">
+            <a:schemeClr val="accent2"/>
+          </a:fillRef>
+          <a:effectRef idx="2">
+            <a:schemeClr val="accent2"/>
+          </a:effectRef>
+          <a:fontRef idx="minor">
+            <a:schemeClr val="tx1"/>
+          </a:fontRef>
+        </p:style>
+      </p:cxnSp>
+      <p:sp>
+        <p:nvSpPr>
+          <p:cNvPr id="41" name="Rectangle 40"/>
+          <p:cNvSpPr/>
+          <p:nvPr/>
+        </p:nvSpPr>
+        <p:spPr>
+          <a:xfrm>
+            <a:off x="5138737" y="6946756"/>
+            <a:ext cx="2867025" cy="955936"/>
+          </a:xfrm>
+          <a:prstGeom prst="rect">
+            <a:avLst/>
+          </a:prstGeom>
+        </p:spPr>
+        <p:style>
+          <a:lnRef idx="2">
+            <a:schemeClr val="accent1">
+              <a:shade val="50000"/>
+            </a:schemeClr>
+          </a:lnRef>
+          <a:fillRef idx="1">
+            <a:schemeClr val="accent1"/>
+          </a:fillRef>
+          <a:effectRef idx="0">
+            <a:schemeClr val="accent1"/>
+          </a:effectRef>
+          <a:fontRef idx="minor">
+            <a:schemeClr val="lt1"/>
+          </a:fontRef>
+        </p:style>
+        <p:txBody>
+          <a:bodyPr rot="0" spcFirstLastPara="0" vertOverflow="overflow" horzOverflow="overflow" vert="horz" wrap="square" lIns="80998" tIns="40499" rIns="80998" bIns="40499" numCol="1" spcCol="0" rtlCol="0" fromWordArt="0" anchor="ctr" anchorCtr="0" forceAA="0" compatLnSpc="1">
+            <a:prstTxWarp prst="textNoShape">
+              <a:avLst/>
+            </a:prstTxWarp>
+            <a:noAutofit/>
+          </a:bodyPr>
+          <a:lstStyle/>
+          <a:p>
+            <a:pPr algn="ctr"/>
+            <a:r>
+              <a:rPr lang="de-DE" sz="1594" dirty="0" smtClean="0"/>
+              <a:t>Crops the image to</a:t>
+            </a:r>
+          </a:p>
+          <a:p>
+            <a:pPr algn="ctr"/>
+            <a:r>
+              <a:rPr lang="de-DE" sz="1594" dirty="0" smtClean="0"/>
+              <a:t>the collision box</a:t>
+            </a:r>
+            <a:endParaRPr lang="de-DE" sz="1594" dirty="0" smtClean="0"/>
+          </a:p>
+          <a:p>
+            <a:pPr algn="ctr"/>
+            <a:r>
+              <a:rPr lang="de-DE" sz="1594" dirty="0" smtClean="0"/>
+              <a:t>(WARNING: not reversable)</a:t>
+            </a:r>
+            <a:endParaRPr lang="de-DE" sz="1594" dirty="0"/>
+          </a:p>
+        </p:txBody>
+      </p:sp>
+      <p:cxnSp>
+        <p:nvCxnSpPr>
+          <p:cNvPr id="42" name="Straight Arrow Connector 41"/>
+          <p:cNvCxnSpPr>
+            <a:stCxn id="41" idx="0"/>
+          </p:cNvCxnSpPr>
+          <p:nvPr/>
+        </p:nvCxnSpPr>
+        <p:spPr>
+          <a:xfrm flipH="1" flipV="1">
+            <a:off x="4318000" y="5919274"/>
+            <a:ext cx="2254250" cy="1027482"/>
+          </a:xfrm>
+          <a:prstGeom prst="straightConnector1">
+            <a:avLst/>
+          </a:prstGeom>
+          <a:ln>
+            <a:tailEnd type="triangle"/>
+          </a:ln>
+        </p:spPr>
+        <p:style>
+          <a:lnRef idx="3">
+            <a:schemeClr val="accent2"/>
+          </a:lnRef>
+          <a:fillRef idx="0">
+            <a:schemeClr val="accent2"/>
+          </a:fillRef>
+          <a:effectRef idx="2">
+            <a:schemeClr val="accent2"/>
+          </a:effectRef>
+          <a:fontRef idx="minor">
+            <a:schemeClr val="tx1"/>
+          </a:fontRef>
+        </p:style>
+      </p:cxnSp>
+      <p:sp>
+        <p:nvSpPr>
+          <p:cNvPr id="47" name="Rectangle 46"/>
+          <p:cNvSpPr/>
+          <p:nvPr/>
+        </p:nvSpPr>
+        <p:spPr>
+          <a:xfrm>
+            <a:off x="7141540" y="877987"/>
+            <a:ext cx="2724150" cy="859629"/>
+          </a:xfrm>
+          <a:prstGeom prst="rect">
+            <a:avLst/>
+          </a:prstGeom>
+        </p:spPr>
+        <p:style>
+          <a:lnRef idx="2">
+            <a:schemeClr val="accent1">
+              <a:shade val="50000"/>
+            </a:schemeClr>
+          </a:lnRef>
+          <a:fillRef idx="1">
+            <a:schemeClr val="accent1"/>
+          </a:fillRef>
+          <a:effectRef idx="0">
+            <a:schemeClr val="accent1"/>
+          </a:effectRef>
+          <a:fontRef idx="minor">
+            <a:schemeClr val="lt1"/>
+          </a:fontRef>
+        </p:style>
+        <p:txBody>
+          <a:bodyPr rot="0" spcFirstLastPara="0" vertOverflow="overflow" horzOverflow="overflow" vert="horz" wrap="square" lIns="80998" tIns="40499" rIns="80998" bIns="40499" numCol="1" spcCol="0" rtlCol="0" fromWordArt="0" anchor="ctr" anchorCtr="0" forceAA="0" compatLnSpc="1">
+            <a:prstTxWarp prst="textNoShape">
+              <a:avLst/>
+            </a:prstTxWarp>
+            <a:noAutofit/>
+          </a:bodyPr>
+          <a:lstStyle/>
+          <a:p>
+            <a:pPr algn="ctr"/>
+            <a:r>
+              <a:rPr lang="de-DE" sz="1594" dirty="0" smtClean="0"/>
+              <a:t>tile size to lock the boxes onto</a:t>
+            </a:r>
+            <a:endParaRPr lang="de-DE" sz="1594" dirty="0"/>
+          </a:p>
+        </p:txBody>
+      </p:sp>
+      <p:cxnSp>
+        <p:nvCxnSpPr>
+          <p:cNvPr id="48" name="Straight Arrow Connector 47"/>
+          <p:cNvCxnSpPr>
+            <a:stCxn id="47" idx="2"/>
+          </p:cNvCxnSpPr>
+          <p:nvPr/>
+        </p:nvCxnSpPr>
+        <p:spPr>
+          <a:xfrm flipH="1">
+            <a:off x="6136653" y="1737616"/>
+            <a:ext cx="2366962" cy="853636"/>
           </a:xfrm>
           <a:prstGeom prst="straightConnector1">
             <a:avLst/>

</xml_diff>